<commit_message>
images are loading and no errors in code
</commit_message>
<xml_diff>
--- a/ArtworkEditors/PPTX_Color_Sampler.pptx
+++ b/ArtworkEditors/PPTX_Color_Sampler.pptx
@@ -104,6 +104,11 @@
       </a:defRPr>
     </a:lvl9pPr>
   </p:defaultTextStyle>
+  <p:extLst>
+    <p:ext uri="{EFAFB233-063F-42B5-8137-9DF3F51BA10A}">
+      <p15:sldGuideLst xmlns:p15="http://schemas.microsoft.com/office/powerpoint/2012/main"/>
+    </p:ext>
+  </p:extLst>
 </p:presentation>
 </file>
 
@@ -3321,56 +3326,6 @@
           <a:chExt cx="0" cy="0"/>
         </a:xfrm>
       </p:grpSpPr>
-      <p:sp>
-        <p:nvSpPr>
-          <p:cNvPr id="2" name="Title 1">
-            <a:extLst>
-              <a:ext uri="{FF2B5EF4-FFF2-40B4-BE49-F238E27FC236}">
-                <a16:creationId xmlns:a16="http://schemas.microsoft.com/office/drawing/2014/main" id="{30688D9C-63B9-1100-0375-3ABFF5640EE2}"/>
-              </a:ext>
-            </a:extLst>
-          </p:cNvPr>
-          <p:cNvSpPr>
-            <a:spLocks noGrp="1"/>
-          </p:cNvSpPr>
-          <p:nvPr>
-            <p:ph type="ctrTitle"/>
-          </p:nvPr>
-        </p:nvSpPr>
-        <p:spPr/>
-        <p:txBody>
-          <a:bodyPr/>
-          <a:lstStyle/>
-          <a:p>
-            <a:endParaRPr lang="en-US"/>
-          </a:p>
-        </p:txBody>
-      </p:sp>
-      <p:sp>
-        <p:nvSpPr>
-          <p:cNvPr id="3" name="Subtitle 2">
-            <a:extLst>
-              <a:ext uri="{FF2B5EF4-FFF2-40B4-BE49-F238E27FC236}">
-                <a16:creationId xmlns:a16="http://schemas.microsoft.com/office/drawing/2014/main" id="{ADCDD779-F939-6000-6474-FA90D292C65C}"/>
-              </a:ext>
-            </a:extLst>
-          </p:cNvPr>
-          <p:cNvSpPr>
-            <a:spLocks noGrp="1"/>
-          </p:cNvSpPr>
-          <p:nvPr>
-            <p:ph type="subTitle" idx="1"/>
-          </p:nvPr>
-        </p:nvSpPr>
-        <p:spPr/>
-        <p:txBody>
-          <a:bodyPr/>
-          <a:lstStyle/>
-          <a:p>
-            <a:endParaRPr lang="en-US" dirty="0"/>
-          </a:p>
-        </p:txBody>
-      </p:sp>
       <p:pic>
         <p:nvPicPr>
           <p:cNvPr id="4" name="Picture 3" descr="Amazing Charoite Purple Sphere MOST BEAUTIFUL SPHERE | eBay">
@@ -3540,7 +3495,7 @@
         </p:nvSpPr>
         <p:spPr>
           <a:xfrm>
-            <a:off x="4895850" y="4995862"/>
+            <a:off x="2741126" y="4995862"/>
             <a:ext cx="1466850" cy="561975"/>
           </a:xfrm>
           <a:prstGeom prst="rect">
@@ -3679,7 +3634,7 @@
           <a:p>
             <a:pPr algn="ctr"/>
             <a:r>
-              <a:rPr lang="en-US" sz="1600"/>
+              <a:rPr lang="en-US" sz="1600" dirty="0"/>
               <a:t>REGENERATE</a:t>
             </a:r>
           </a:p>
@@ -3699,7 +3654,7 @@
         </p:nvSpPr>
         <p:spPr>
           <a:xfrm>
-            <a:off x="2628900" y="4995862"/>
+            <a:off x="474176" y="4995862"/>
             <a:ext cx="1466850" cy="561975"/>
           </a:xfrm>
           <a:prstGeom prst="rect">
@@ -3858,7 +3813,7 @@
         </p:nvSpPr>
         <p:spPr>
           <a:xfrm>
-            <a:off x="4895850" y="6053137"/>
+            <a:off x="2741126" y="6053137"/>
             <a:ext cx="1466850" cy="561975"/>
           </a:xfrm>
           <a:prstGeom prst="rect">
@@ -4016,7 +3971,7 @@
         </p:nvSpPr>
         <p:spPr>
           <a:xfrm>
-            <a:off x="2628900" y="6053137"/>
+            <a:off x="474176" y="6053137"/>
             <a:ext cx="1466850" cy="561975"/>
           </a:xfrm>
           <a:prstGeom prst="rect">
@@ -4176,14 +4131,14 @@
         </p:nvSpPr>
         <p:spPr>
           <a:xfrm>
-            <a:off x="262550" y="235390"/>
-            <a:ext cx="1023042" cy="407406"/>
+            <a:off x="6505574" y="3322927"/>
+            <a:ext cx="2527589" cy="2994745"/>
           </a:xfrm>
           <a:prstGeom prst="rect">
             <a:avLst/>
           </a:prstGeom>
           <a:solidFill>
-            <a:srgbClr val="E678DC"/>
+            <a:schemeClr val="tx1"/>
           </a:solidFill>
         </p:spPr>
         <p:style>
@@ -4208,6 +4163,501 @@
           <a:p>
             <a:pPr algn="ctr"/>
             <a:endParaRPr lang="en-US"/>
+          </a:p>
+        </p:txBody>
+      </p:sp>
+      <p:sp>
+        <p:nvSpPr>
+          <p:cNvPr id="13" name="Rectangle 12">
+            <a:extLst>
+              <a:ext uri="{FF2B5EF4-FFF2-40B4-BE49-F238E27FC236}">
+                <a16:creationId xmlns:a16="http://schemas.microsoft.com/office/drawing/2014/main" id="{4C8DFAFB-578B-781C-EA8B-E98EC9749770}"/>
+              </a:ext>
+            </a:extLst>
+          </p:cNvPr>
+          <p:cNvSpPr/>
+          <p:nvPr/>
+        </p:nvSpPr>
+        <p:spPr>
+          <a:xfrm>
+            <a:off x="6734175" y="3807618"/>
+            <a:ext cx="1466850" cy="561975"/>
+          </a:xfrm>
+          <a:prstGeom prst="rect">
+            <a:avLst/>
+          </a:prstGeom>
+          <a:solidFill>
+            <a:srgbClr val="5A3C96"/>
+          </a:solidFill>
+          <a:ln>
+            <a:noFill/>
+          </a:ln>
+          <a:effectLst>
+            <a:glow rad="228600">
+              <a:srgbClr val="AA7DE6">
+                <a:alpha val="40000"/>
+              </a:srgbClr>
+            </a:glow>
+          </a:effectLst>
+          <a:scene3d>
+            <a:camera prst="perspectiveContrastingRightFacing"/>
+            <a:lightRig rig="threePt" dir="t"/>
+          </a:scene3d>
+          <a:sp3d>
+            <a:bevelT w="165100" prst="coolSlant"/>
+          </a:sp3d>
+        </p:spPr>
+        <p:style>
+          <a:lnRef idx="2">
+            <a:schemeClr val="accent1">
+              <a:shade val="15000"/>
+            </a:schemeClr>
+          </a:lnRef>
+          <a:fillRef idx="1">
+            <a:schemeClr val="accent1"/>
+          </a:fillRef>
+          <a:effectRef idx="0">
+            <a:schemeClr val="accent1"/>
+          </a:effectRef>
+          <a:fontRef idx="minor">
+            <a:schemeClr val="lt1"/>
+          </a:fontRef>
+        </p:style>
+        <p:txBody>
+          <a:bodyPr rot="0" spcFirstLastPara="0" vert="horz" wrap="square" lIns="0" tIns="0" rIns="0" bIns="0" numCol="1" spcCol="0" rtlCol="0" fromWordArt="0" anchor="ctr" anchorCtr="0" forceAA="0" compatLnSpc="1">
+            <a:prstTxWarp prst="textNoShape">
+              <a:avLst/>
+            </a:prstTxWarp>
+            <a:noAutofit/>
+          </a:bodyPr>
+          <a:lstStyle>
+            <a:lvl1pPr marL="0" indent="0">
+              <a:defRPr sz="1100">
+                <a:solidFill>
+                  <a:schemeClr val="lt1"/>
+                </a:solidFill>
+                <a:latin typeface="+mn-lt"/>
+                <a:ea typeface="+mn-ea"/>
+                <a:cs typeface="+mn-cs"/>
+              </a:defRPr>
+            </a:lvl1pPr>
+            <a:lvl2pPr marL="457200" indent="0">
+              <a:defRPr sz="1100">
+                <a:solidFill>
+                  <a:schemeClr val="lt1"/>
+                </a:solidFill>
+                <a:latin typeface="+mn-lt"/>
+                <a:ea typeface="+mn-ea"/>
+                <a:cs typeface="+mn-cs"/>
+              </a:defRPr>
+            </a:lvl2pPr>
+            <a:lvl3pPr marL="914400" indent="0">
+              <a:defRPr sz="1100">
+                <a:solidFill>
+                  <a:schemeClr val="lt1"/>
+                </a:solidFill>
+                <a:latin typeface="+mn-lt"/>
+                <a:ea typeface="+mn-ea"/>
+                <a:cs typeface="+mn-cs"/>
+              </a:defRPr>
+            </a:lvl3pPr>
+            <a:lvl4pPr marL="1371600" indent="0">
+              <a:defRPr sz="1100">
+                <a:solidFill>
+                  <a:schemeClr val="lt1"/>
+                </a:solidFill>
+                <a:latin typeface="+mn-lt"/>
+                <a:ea typeface="+mn-ea"/>
+                <a:cs typeface="+mn-cs"/>
+              </a:defRPr>
+            </a:lvl4pPr>
+            <a:lvl5pPr marL="1828800" indent="0">
+              <a:defRPr sz="1100">
+                <a:solidFill>
+                  <a:schemeClr val="lt1"/>
+                </a:solidFill>
+                <a:latin typeface="+mn-lt"/>
+                <a:ea typeface="+mn-ea"/>
+                <a:cs typeface="+mn-cs"/>
+              </a:defRPr>
+            </a:lvl5pPr>
+            <a:lvl6pPr marL="2286000" indent="0">
+              <a:defRPr sz="1100">
+                <a:solidFill>
+                  <a:schemeClr val="lt1"/>
+                </a:solidFill>
+                <a:latin typeface="+mn-lt"/>
+                <a:ea typeface="+mn-ea"/>
+                <a:cs typeface="+mn-cs"/>
+              </a:defRPr>
+            </a:lvl6pPr>
+            <a:lvl7pPr marL="2743200" indent="0">
+              <a:defRPr sz="1100">
+                <a:solidFill>
+                  <a:schemeClr val="lt1"/>
+                </a:solidFill>
+                <a:latin typeface="+mn-lt"/>
+                <a:ea typeface="+mn-ea"/>
+                <a:cs typeface="+mn-cs"/>
+              </a:defRPr>
+            </a:lvl7pPr>
+            <a:lvl8pPr marL="3200400" indent="0">
+              <a:defRPr sz="1100">
+                <a:solidFill>
+                  <a:schemeClr val="lt1"/>
+                </a:solidFill>
+                <a:latin typeface="+mn-lt"/>
+                <a:ea typeface="+mn-ea"/>
+                <a:cs typeface="+mn-cs"/>
+              </a:defRPr>
+            </a:lvl8pPr>
+            <a:lvl9pPr marL="3657600" indent="0">
+              <a:defRPr sz="1100">
+                <a:solidFill>
+                  <a:schemeClr val="lt1"/>
+                </a:solidFill>
+                <a:latin typeface="+mn-lt"/>
+                <a:ea typeface="+mn-ea"/>
+                <a:cs typeface="+mn-cs"/>
+              </a:defRPr>
+            </a:lvl9pPr>
+          </a:lstStyle>
+          <a:p>
+            <a:pPr algn="ctr"/>
+            <a:r>
+              <a:rPr lang="en-US" sz="1800" dirty="0"/>
+              <a:t>Metal</a:t>
+            </a:r>
+          </a:p>
+        </p:txBody>
+      </p:sp>
+      <p:sp>
+        <p:nvSpPr>
+          <p:cNvPr id="16" name="Rectangle 15">
+            <a:extLst>
+              <a:ext uri="{FF2B5EF4-FFF2-40B4-BE49-F238E27FC236}">
+                <a16:creationId xmlns:a16="http://schemas.microsoft.com/office/drawing/2014/main" id="{06B87223-B3F5-06E4-F9BC-25264FA8FAE8}"/>
+              </a:ext>
+            </a:extLst>
+          </p:cNvPr>
+          <p:cNvSpPr/>
+          <p:nvPr/>
+        </p:nvSpPr>
+        <p:spPr>
+          <a:xfrm>
+            <a:off x="6734175" y="4650580"/>
+            <a:ext cx="1466850" cy="561975"/>
+          </a:xfrm>
+          <a:prstGeom prst="rect">
+            <a:avLst/>
+          </a:prstGeom>
+          <a:solidFill>
+            <a:srgbClr val="C87D50"/>
+          </a:solidFill>
+          <a:ln>
+            <a:noFill/>
+          </a:ln>
+          <a:effectLst>
+            <a:glow rad="241300">
+              <a:srgbClr val="E19696">
+                <a:alpha val="40000"/>
+              </a:srgbClr>
+            </a:glow>
+          </a:effectLst>
+          <a:scene3d>
+            <a:camera prst="perspectiveContrastingRightFacing"/>
+            <a:lightRig rig="threePt" dir="t"/>
+          </a:scene3d>
+          <a:sp3d>
+            <a:bevelT w="165100" prst="coolSlant"/>
+          </a:sp3d>
+        </p:spPr>
+        <p:style>
+          <a:lnRef idx="2">
+            <a:schemeClr val="accent1">
+              <a:shade val="15000"/>
+            </a:schemeClr>
+          </a:lnRef>
+          <a:fillRef idx="1">
+            <a:schemeClr val="accent1"/>
+          </a:fillRef>
+          <a:effectRef idx="0">
+            <a:schemeClr val="accent1"/>
+          </a:effectRef>
+          <a:fontRef idx="minor">
+            <a:schemeClr val="lt1"/>
+          </a:fontRef>
+        </p:style>
+        <p:txBody>
+          <a:bodyPr rot="0" spcFirstLastPara="0" vert="horz" wrap="square" lIns="0" tIns="0" rIns="0" bIns="0" numCol="1" spcCol="0" rtlCol="0" fromWordArt="0" anchor="ctr" anchorCtr="0" forceAA="0" compatLnSpc="1">
+            <a:prstTxWarp prst="textNoShape">
+              <a:avLst/>
+            </a:prstTxWarp>
+            <a:noAutofit/>
+          </a:bodyPr>
+          <a:lstStyle>
+            <a:lvl1pPr marL="0" indent="0">
+              <a:defRPr sz="1100">
+                <a:solidFill>
+                  <a:schemeClr val="lt1"/>
+                </a:solidFill>
+                <a:latin typeface="+mn-lt"/>
+                <a:ea typeface="+mn-ea"/>
+                <a:cs typeface="+mn-cs"/>
+              </a:defRPr>
+            </a:lvl1pPr>
+            <a:lvl2pPr marL="457200" indent="0">
+              <a:defRPr sz="1100">
+                <a:solidFill>
+                  <a:schemeClr val="lt1"/>
+                </a:solidFill>
+                <a:latin typeface="+mn-lt"/>
+                <a:ea typeface="+mn-ea"/>
+                <a:cs typeface="+mn-cs"/>
+              </a:defRPr>
+            </a:lvl2pPr>
+            <a:lvl3pPr marL="914400" indent="0">
+              <a:defRPr sz="1100">
+                <a:solidFill>
+                  <a:schemeClr val="lt1"/>
+                </a:solidFill>
+                <a:latin typeface="+mn-lt"/>
+                <a:ea typeface="+mn-ea"/>
+                <a:cs typeface="+mn-cs"/>
+              </a:defRPr>
+            </a:lvl3pPr>
+            <a:lvl4pPr marL="1371600" indent="0">
+              <a:defRPr sz="1100">
+                <a:solidFill>
+                  <a:schemeClr val="lt1"/>
+                </a:solidFill>
+                <a:latin typeface="+mn-lt"/>
+                <a:ea typeface="+mn-ea"/>
+                <a:cs typeface="+mn-cs"/>
+              </a:defRPr>
+            </a:lvl4pPr>
+            <a:lvl5pPr marL="1828800" indent="0">
+              <a:defRPr sz="1100">
+                <a:solidFill>
+                  <a:schemeClr val="lt1"/>
+                </a:solidFill>
+                <a:latin typeface="+mn-lt"/>
+                <a:ea typeface="+mn-ea"/>
+                <a:cs typeface="+mn-cs"/>
+              </a:defRPr>
+            </a:lvl5pPr>
+            <a:lvl6pPr marL="2286000" indent="0">
+              <a:defRPr sz="1100">
+                <a:solidFill>
+                  <a:schemeClr val="lt1"/>
+                </a:solidFill>
+                <a:latin typeface="+mn-lt"/>
+                <a:ea typeface="+mn-ea"/>
+                <a:cs typeface="+mn-cs"/>
+              </a:defRPr>
+            </a:lvl6pPr>
+            <a:lvl7pPr marL="2743200" indent="0">
+              <a:defRPr sz="1100">
+                <a:solidFill>
+                  <a:schemeClr val="lt1"/>
+                </a:solidFill>
+                <a:latin typeface="+mn-lt"/>
+                <a:ea typeface="+mn-ea"/>
+                <a:cs typeface="+mn-cs"/>
+              </a:defRPr>
+            </a:lvl7pPr>
+            <a:lvl8pPr marL="3200400" indent="0">
+              <a:defRPr sz="1100">
+                <a:solidFill>
+                  <a:schemeClr val="lt1"/>
+                </a:solidFill>
+                <a:latin typeface="+mn-lt"/>
+                <a:ea typeface="+mn-ea"/>
+                <a:cs typeface="+mn-cs"/>
+              </a:defRPr>
+            </a:lvl8pPr>
+            <a:lvl9pPr marL="3657600" indent="0">
+              <a:defRPr sz="1100">
+                <a:solidFill>
+                  <a:schemeClr val="lt1"/>
+                </a:solidFill>
+                <a:latin typeface="+mn-lt"/>
+                <a:ea typeface="+mn-ea"/>
+                <a:cs typeface="+mn-cs"/>
+              </a:defRPr>
+            </a:lvl9pPr>
+          </a:lstStyle>
+          <a:p>
+            <a:pPr algn="ctr"/>
+            <a:r>
+              <a:rPr lang="en-US" sz="1800" dirty="0"/>
+              <a:t>Goods</a:t>
+            </a:r>
+          </a:p>
+        </p:txBody>
+      </p:sp>
+      <p:sp>
+        <p:nvSpPr>
+          <p:cNvPr id="17" name="Rectangle 16">
+            <a:extLst>
+              <a:ext uri="{FF2B5EF4-FFF2-40B4-BE49-F238E27FC236}">
+                <a16:creationId xmlns:a16="http://schemas.microsoft.com/office/drawing/2014/main" id="{CB007EDE-8C50-2EE2-5185-B30F54017E23}"/>
+              </a:ext>
+            </a:extLst>
+          </p:cNvPr>
+          <p:cNvSpPr/>
+          <p:nvPr/>
+        </p:nvSpPr>
+        <p:spPr>
+          <a:xfrm>
+            <a:off x="6734175" y="5426868"/>
+            <a:ext cx="1466850" cy="561975"/>
+          </a:xfrm>
+          <a:prstGeom prst="rect">
+            <a:avLst/>
+          </a:prstGeom>
+          <a:solidFill>
+            <a:srgbClr val="286428"/>
+          </a:solidFill>
+          <a:ln>
+            <a:noFill/>
+          </a:ln>
+          <a:effectLst>
+            <a:glow rad="228600">
+              <a:srgbClr val="78A078">
+                <a:alpha val="40000"/>
+              </a:srgbClr>
+            </a:glow>
+          </a:effectLst>
+          <a:scene3d>
+            <a:camera prst="perspectiveContrastingRightFacing"/>
+            <a:lightRig rig="threePt" dir="t"/>
+          </a:scene3d>
+          <a:sp3d>
+            <a:bevelT w="165100" prst="coolSlant"/>
+          </a:sp3d>
+        </p:spPr>
+        <p:style>
+          <a:lnRef idx="2">
+            <a:schemeClr val="accent1">
+              <a:shade val="15000"/>
+            </a:schemeClr>
+          </a:lnRef>
+          <a:fillRef idx="1">
+            <a:schemeClr val="accent1"/>
+          </a:fillRef>
+          <a:effectRef idx="0">
+            <a:schemeClr val="accent1"/>
+          </a:effectRef>
+          <a:fontRef idx="minor">
+            <a:schemeClr val="lt1"/>
+          </a:fontRef>
+        </p:style>
+        <p:txBody>
+          <a:bodyPr rot="0" spcFirstLastPara="0" vert="horz" wrap="square" lIns="0" tIns="0" rIns="0" bIns="0" numCol="1" spcCol="0" rtlCol="0" fromWordArt="0" anchor="ctr" anchorCtr="0" forceAA="0" compatLnSpc="1">
+            <a:prstTxWarp prst="textNoShape">
+              <a:avLst/>
+            </a:prstTxWarp>
+            <a:noAutofit/>
+          </a:bodyPr>
+          <a:lstStyle>
+            <a:lvl1pPr marL="0" indent="0">
+              <a:defRPr sz="1100">
+                <a:solidFill>
+                  <a:schemeClr val="lt1"/>
+                </a:solidFill>
+                <a:latin typeface="+mn-lt"/>
+                <a:ea typeface="+mn-ea"/>
+                <a:cs typeface="+mn-cs"/>
+              </a:defRPr>
+            </a:lvl1pPr>
+            <a:lvl2pPr marL="457200" indent="0">
+              <a:defRPr sz="1100">
+                <a:solidFill>
+                  <a:schemeClr val="lt1"/>
+                </a:solidFill>
+                <a:latin typeface="+mn-lt"/>
+                <a:ea typeface="+mn-ea"/>
+                <a:cs typeface="+mn-cs"/>
+              </a:defRPr>
+            </a:lvl2pPr>
+            <a:lvl3pPr marL="914400" indent="0">
+              <a:defRPr sz="1100">
+                <a:solidFill>
+                  <a:schemeClr val="lt1"/>
+                </a:solidFill>
+                <a:latin typeface="+mn-lt"/>
+                <a:ea typeface="+mn-ea"/>
+                <a:cs typeface="+mn-cs"/>
+              </a:defRPr>
+            </a:lvl3pPr>
+            <a:lvl4pPr marL="1371600" indent="0">
+              <a:defRPr sz="1100">
+                <a:solidFill>
+                  <a:schemeClr val="lt1"/>
+                </a:solidFill>
+                <a:latin typeface="+mn-lt"/>
+                <a:ea typeface="+mn-ea"/>
+                <a:cs typeface="+mn-cs"/>
+              </a:defRPr>
+            </a:lvl4pPr>
+            <a:lvl5pPr marL="1828800" indent="0">
+              <a:defRPr sz="1100">
+                <a:solidFill>
+                  <a:schemeClr val="lt1"/>
+                </a:solidFill>
+                <a:latin typeface="+mn-lt"/>
+                <a:ea typeface="+mn-ea"/>
+                <a:cs typeface="+mn-cs"/>
+              </a:defRPr>
+            </a:lvl5pPr>
+            <a:lvl6pPr marL="2286000" indent="0">
+              <a:defRPr sz="1100">
+                <a:solidFill>
+                  <a:schemeClr val="lt1"/>
+                </a:solidFill>
+                <a:latin typeface="+mn-lt"/>
+                <a:ea typeface="+mn-ea"/>
+                <a:cs typeface="+mn-cs"/>
+              </a:defRPr>
+            </a:lvl6pPr>
+            <a:lvl7pPr marL="2743200" indent="0">
+              <a:defRPr sz="1100">
+                <a:solidFill>
+                  <a:schemeClr val="lt1"/>
+                </a:solidFill>
+                <a:latin typeface="+mn-lt"/>
+                <a:ea typeface="+mn-ea"/>
+                <a:cs typeface="+mn-cs"/>
+              </a:defRPr>
+            </a:lvl7pPr>
+            <a:lvl8pPr marL="3200400" indent="0">
+              <a:defRPr sz="1100">
+                <a:solidFill>
+                  <a:schemeClr val="lt1"/>
+                </a:solidFill>
+                <a:latin typeface="+mn-lt"/>
+                <a:ea typeface="+mn-ea"/>
+                <a:cs typeface="+mn-cs"/>
+              </a:defRPr>
+            </a:lvl8pPr>
+            <a:lvl9pPr marL="3657600" indent="0">
+              <a:defRPr sz="1100">
+                <a:solidFill>
+                  <a:schemeClr val="lt1"/>
+                </a:solidFill>
+                <a:latin typeface="+mn-lt"/>
+                <a:ea typeface="+mn-ea"/>
+                <a:cs typeface="+mn-cs"/>
+              </a:defRPr>
+            </a:lvl9pPr>
+          </a:lstStyle>
+          <a:p>
+            <a:pPr algn="ctr"/>
+            <a:r>
+              <a:rPr lang="en-US" sz="1800" dirty="0"/>
+              <a:t>Food</a:t>
+            </a:r>
           </a:p>
         </p:txBody>
       </p:sp>

</xml_diff>

<commit_message>
Ui replaced with PNGs and planets are now wiping before regeneration
</commit_message>
<xml_diff>
--- a/ArtworkEditors/PPTX_Color_Sampler.pptx
+++ b/ArtworkEditors/PPTX_Color_Sampler.pptx
@@ -4190,21 +4190,19 @@
             <a:srgbClr val="5A3C96"/>
           </a:solidFill>
           <a:ln>
-            <a:noFill/>
+            <a:solidFill>
+              <a:schemeClr val="bg1"/>
+            </a:solidFill>
           </a:ln>
-          <a:effectLst>
-            <a:glow rad="228600">
-              <a:srgbClr val="AA7DE6">
-                <a:alpha val="40000"/>
-              </a:srgbClr>
-            </a:glow>
-          </a:effectLst>
+          <a:effectLst/>
           <a:scene3d>
-            <a:camera prst="perspectiveContrastingRightFacing"/>
+            <a:camera prst="orthographicFront"/>
             <a:lightRig rig="threePt" dir="t"/>
           </a:scene3d>
-          <a:sp3d>
-            <a:bevelT w="165100" prst="coolSlant"/>
+          <a:sp3d extrusionH="76200" prstMaterial="matte">
+            <a:extrusionClr>
+              <a:schemeClr val="tx1"/>
+            </a:extrusionClr>
           </a:sp3d>
         </p:spPr>
         <p:style>
@@ -4345,7 +4343,7 @@
         </p:nvSpPr>
         <p:spPr>
           <a:xfrm>
-            <a:off x="6734175" y="4650580"/>
+            <a:off x="6734175" y="4433887"/>
             <a:ext cx="1466850" cy="561975"/>
           </a:xfrm>
           <a:prstGeom prst="rect">
@@ -4355,21 +4353,19 @@
             <a:srgbClr val="C87D50"/>
           </a:solidFill>
           <a:ln>
-            <a:noFill/>
+            <a:solidFill>
+              <a:schemeClr val="bg1"/>
+            </a:solidFill>
           </a:ln>
-          <a:effectLst>
-            <a:glow rad="241300">
-              <a:srgbClr val="E19696">
-                <a:alpha val="40000"/>
-              </a:srgbClr>
-            </a:glow>
-          </a:effectLst>
+          <a:effectLst/>
           <a:scene3d>
-            <a:camera prst="perspectiveContrastingRightFacing"/>
+            <a:camera prst="orthographicFront"/>
             <a:lightRig rig="threePt" dir="t"/>
           </a:scene3d>
-          <a:sp3d>
-            <a:bevelT w="165100" prst="coolSlant"/>
+          <a:sp3d extrusionH="76200" prstMaterial="matte">
+            <a:extrusionClr>
+              <a:schemeClr val="tx1"/>
+            </a:extrusionClr>
           </a:sp3d>
         </p:spPr>
         <p:style>
@@ -4510,7 +4506,7 @@
         </p:nvSpPr>
         <p:spPr>
           <a:xfrm>
-            <a:off x="6734175" y="5426868"/>
+            <a:off x="6734175" y="5060156"/>
             <a:ext cx="1466850" cy="561975"/>
           </a:xfrm>
           <a:prstGeom prst="rect">
@@ -4520,21 +4516,19 @@
             <a:srgbClr val="286428"/>
           </a:solidFill>
           <a:ln>
-            <a:noFill/>
+            <a:solidFill>
+              <a:schemeClr val="bg1"/>
+            </a:solidFill>
           </a:ln>
-          <a:effectLst>
-            <a:glow rad="228600">
-              <a:srgbClr val="78A078">
-                <a:alpha val="40000"/>
-              </a:srgbClr>
-            </a:glow>
-          </a:effectLst>
+          <a:effectLst/>
           <a:scene3d>
-            <a:camera prst="perspectiveContrastingRightFacing"/>
+            <a:camera prst="orthographicFront"/>
             <a:lightRig rig="threePt" dir="t"/>
           </a:scene3d>
-          <a:sp3d>
-            <a:bevelT w="165100" prst="coolSlant"/>
+          <a:sp3d extrusionH="76200" prstMaterial="matte">
+            <a:extrusionClr>
+              <a:schemeClr val="tx1"/>
+            </a:extrusionClr>
           </a:sp3d>
         </p:spPr>
         <p:style>

</xml_diff>

<commit_message>
Ship art and nonfunctioning codeblock
</commit_message>
<xml_diff>
--- a/ArtworkEditors/PPTX_Color_Sampler.pptx
+++ b/ArtworkEditors/PPTX_Color_Sampler.pptx
@@ -260,7 +260,7 @@
           <a:p>
             <a:fld id="{01C2E234-DB8B-43AE-8113-E148DA592BAA}" type="datetimeFigureOut">
               <a:rPr lang="en-US" smtClean="0"/>
-              <a:t>8/9/2025</a:t>
+              <a:t>8/12/2025</a:t>
             </a:fld>
             <a:endParaRPr lang="en-US"/>
           </a:p>
@@ -458,7 +458,7 @@
           <a:p>
             <a:fld id="{01C2E234-DB8B-43AE-8113-E148DA592BAA}" type="datetimeFigureOut">
               <a:rPr lang="en-US" smtClean="0"/>
-              <a:t>8/9/2025</a:t>
+              <a:t>8/12/2025</a:t>
             </a:fld>
             <a:endParaRPr lang="en-US"/>
           </a:p>
@@ -666,7 +666,7 @@
           <a:p>
             <a:fld id="{01C2E234-DB8B-43AE-8113-E148DA592BAA}" type="datetimeFigureOut">
               <a:rPr lang="en-US" smtClean="0"/>
-              <a:t>8/9/2025</a:t>
+              <a:t>8/12/2025</a:t>
             </a:fld>
             <a:endParaRPr lang="en-US"/>
           </a:p>
@@ -864,7 +864,7 @@
           <a:p>
             <a:fld id="{01C2E234-DB8B-43AE-8113-E148DA592BAA}" type="datetimeFigureOut">
               <a:rPr lang="en-US" smtClean="0"/>
-              <a:t>8/9/2025</a:t>
+              <a:t>8/12/2025</a:t>
             </a:fld>
             <a:endParaRPr lang="en-US"/>
           </a:p>
@@ -1139,7 +1139,7 @@
           <a:p>
             <a:fld id="{01C2E234-DB8B-43AE-8113-E148DA592BAA}" type="datetimeFigureOut">
               <a:rPr lang="en-US" smtClean="0"/>
-              <a:t>8/9/2025</a:t>
+              <a:t>8/12/2025</a:t>
             </a:fld>
             <a:endParaRPr lang="en-US"/>
           </a:p>
@@ -1404,7 +1404,7 @@
           <a:p>
             <a:fld id="{01C2E234-DB8B-43AE-8113-E148DA592BAA}" type="datetimeFigureOut">
               <a:rPr lang="en-US" smtClean="0"/>
-              <a:t>8/9/2025</a:t>
+              <a:t>8/12/2025</a:t>
             </a:fld>
             <a:endParaRPr lang="en-US"/>
           </a:p>
@@ -1816,7 +1816,7 @@
           <a:p>
             <a:fld id="{01C2E234-DB8B-43AE-8113-E148DA592BAA}" type="datetimeFigureOut">
               <a:rPr lang="en-US" smtClean="0"/>
-              <a:t>8/9/2025</a:t>
+              <a:t>8/12/2025</a:t>
             </a:fld>
             <a:endParaRPr lang="en-US"/>
           </a:p>
@@ -1957,7 +1957,7 @@
           <a:p>
             <a:fld id="{01C2E234-DB8B-43AE-8113-E148DA592BAA}" type="datetimeFigureOut">
               <a:rPr lang="en-US" smtClean="0"/>
-              <a:t>8/9/2025</a:t>
+              <a:t>8/12/2025</a:t>
             </a:fld>
             <a:endParaRPr lang="en-US"/>
           </a:p>
@@ -2070,7 +2070,7 @@
           <a:p>
             <a:fld id="{01C2E234-DB8B-43AE-8113-E148DA592BAA}" type="datetimeFigureOut">
               <a:rPr lang="en-US" smtClean="0"/>
-              <a:t>8/9/2025</a:t>
+              <a:t>8/12/2025</a:t>
             </a:fld>
             <a:endParaRPr lang="en-US"/>
           </a:p>
@@ -2381,7 +2381,7 @@
           <a:p>
             <a:fld id="{01C2E234-DB8B-43AE-8113-E148DA592BAA}" type="datetimeFigureOut">
               <a:rPr lang="en-US" smtClean="0"/>
-              <a:t>8/9/2025</a:t>
+              <a:t>8/12/2025</a:t>
             </a:fld>
             <a:endParaRPr lang="en-US"/>
           </a:p>
@@ -2669,7 +2669,7 @@
           <a:p>
             <a:fld id="{01C2E234-DB8B-43AE-8113-E148DA592BAA}" type="datetimeFigureOut">
               <a:rPr lang="en-US" smtClean="0"/>
-              <a:t>8/9/2025</a:t>
+              <a:t>8/12/2025</a:t>
             </a:fld>
             <a:endParaRPr lang="en-US"/>
           </a:p>
@@ -2910,7 +2910,7 @@
           <a:p>
             <a:fld id="{01C2E234-DB8B-43AE-8113-E148DA592BAA}" type="datetimeFigureOut">
               <a:rPr lang="en-US" smtClean="0"/>
-              <a:t>8/9/2025</a:t>
+              <a:t>8/12/2025</a:t>
             </a:fld>
             <a:endParaRPr lang="en-US"/>
           </a:p>
@@ -4688,6 +4688,55 @@
       </p:grpSpPr>
       <p:sp>
         <p:nvSpPr>
+          <p:cNvPr id="7" name="Rectangle 6">
+            <a:extLst>
+              <a:ext uri="{FF2B5EF4-FFF2-40B4-BE49-F238E27FC236}">
+                <a16:creationId xmlns:a16="http://schemas.microsoft.com/office/drawing/2014/main" id="{5B0F97D9-366F-97BB-55F8-976D3B5F0698}"/>
+              </a:ext>
+            </a:extLst>
+          </p:cNvPr>
+          <p:cNvSpPr/>
+          <p:nvPr/>
+        </p:nvSpPr>
+        <p:spPr>
+          <a:xfrm>
+            <a:off x="5876310" y="1385972"/>
+            <a:ext cx="2527589" cy="2994745"/>
+          </a:xfrm>
+          <a:prstGeom prst="rect">
+            <a:avLst/>
+          </a:prstGeom>
+          <a:solidFill>
+            <a:schemeClr val="tx1"/>
+          </a:solidFill>
+        </p:spPr>
+        <p:style>
+          <a:lnRef idx="2">
+            <a:schemeClr val="accent1">
+              <a:shade val="15000"/>
+            </a:schemeClr>
+          </a:lnRef>
+          <a:fillRef idx="1">
+            <a:schemeClr val="accent1"/>
+          </a:fillRef>
+          <a:effectRef idx="0">
+            <a:schemeClr val="accent1"/>
+          </a:effectRef>
+          <a:fontRef idx="minor">
+            <a:schemeClr val="lt1"/>
+          </a:fontRef>
+        </p:style>
+        <p:txBody>
+          <a:bodyPr rtlCol="0" anchor="ctr"/>
+          <a:lstStyle/>
+          <a:p>
+            <a:pPr algn="ctr"/>
+            <a:endParaRPr lang="en-US"/>
+          </a:p>
+        </p:txBody>
+      </p:sp>
+      <p:sp>
+        <p:nvSpPr>
           <p:cNvPr id="2" name="Cube 1">
             <a:extLst>
               <a:ext uri="{FF2B5EF4-FFF2-40B4-BE49-F238E27FC236}">
@@ -4866,6 +4915,276 @@
           <a:solidFill>
             <a:srgbClr val="4D4D4D"/>
           </a:solidFill>
+        </p:spPr>
+        <p:style>
+          <a:lnRef idx="2">
+            <a:schemeClr val="accent1">
+              <a:shade val="15000"/>
+            </a:schemeClr>
+          </a:lnRef>
+          <a:fillRef idx="1">
+            <a:schemeClr val="accent1"/>
+          </a:fillRef>
+          <a:effectRef idx="0">
+            <a:schemeClr val="accent1"/>
+          </a:effectRef>
+          <a:fontRef idx="minor">
+            <a:schemeClr val="lt1"/>
+          </a:fontRef>
+        </p:style>
+        <p:txBody>
+          <a:bodyPr rtlCol="0" anchor="ctr"/>
+          <a:lstStyle/>
+          <a:p>
+            <a:pPr algn="ctr"/>
+            <a:endParaRPr lang="en-US"/>
+          </a:p>
+        </p:txBody>
+      </p:sp>
+      <p:sp>
+        <p:nvSpPr>
+          <p:cNvPr id="6" name="Isosceles Triangle 5">
+            <a:extLst>
+              <a:ext uri="{FF2B5EF4-FFF2-40B4-BE49-F238E27FC236}">
+                <a16:creationId xmlns:a16="http://schemas.microsoft.com/office/drawing/2014/main" id="{26126026-3EEF-04CC-1DE9-9512303BCE30}"/>
+              </a:ext>
+            </a:extLst>
+          </p:cNvPr>
+          <p:cNvSpPr/>
+          <p:nvPr/>
+        </p:nvSpPr>
+        <p:spPr>
+          <a:xfrm>
+            <a:off x="6096000" y="2425700"/>
+            <a:ext cx="235974" cy="386326"/>
+          </a:xfrm>
+          <a:prstGeom prst="triangle">
+            <a:avLst/>
+          </a:prstGeom>
+          <a:solidFill>
+            <a:schemeClr val="accent3"/>
+          </a:solidFill>
+          <a:ln>
+            <a:solidFill>
+              <a:schemeClr val="bg1"/>
+            </a:solidFill>
+          </a:ln>
+        </p:spPr>
+        <p:style>
+          <a:lnRef idx="2">
+            <a:schemeClr val="accent1">
+              <a:shade val="15000"/>
+            </a:schemeClr>
+          </a:lnRef>
+          <a:fillRef idx="1">
+            <a:schemeClr val="accent1"/>
+          </a:fillRef>
+          <a:effectRef idx="0">
+            <a:schemeClr val="accent1"/>
+          </a:effectRef>
+          <a:fontRef idx="minor">
+            <a:schemeClr val="lt1"/>
+          </a:fontRef>
+        </p:style>
+        <p:txBody>
+          <a:bodyPr rtlCol="0" anchor="ctr"/>
+          <a:lstStyle/>
+          <a:p>
+            <a:pPr algn="ctr"/>
+            <a:endParaRPr lang="en-US"/>
+          </a:p>
+        </p:txBody>
+      </p:sp>
+      <p:sp>
+        <p:nvSpPr>
+          <p:cNvPr id="8" name="Isosceles Triangle 7">
+            <a:extLst>
+              <a:ext uri="{FF2B5EF4-FFF2-40B4-BE49-F238E27FC236}">
+                <a16:creationId xmlns:a16="http://schemas.microsoft.com/office/drawing/2014/main" id="{EF794E68-D417-77C3-F7D1-2AD07F4C0905}"/>
+              </a:ext>
+            </a:extLst>
+          </p:cNvPr>
+          <p:cNvSpPr/>
+          <p:nvPr/>
+        </p:nvSpPr>
+        <p:spPr>
+          <a:xfrm>
+            <a:off x="6551664" y="2425700"/>
+            <a:ext cx="235974" cy="386326"/>
+          </a:xfrm>
+          <a:prstGeom prst="triangle">
+            <a:avLst/>
+          </a:prstGeom>
+          <a:solidFill>
+            <a:schemeClr val="accent5"/>
+          </a:solidFill>
+          <a:ln>
+            <a:solidFill>
+              <a:schemeClr val="bg1"/>
+            </a:solidFill>
+          </a:ln>
+        </p:spPr>
+        <p:style>
+          <a:lnRef idx="2">
+            <a:schemeClr val="accent1">
+              <a:shade val="15000"/>
+            </a:schemeClr>
+          </a:lnRef>
+          <a:fillRef idx="1">
+            <a:schemeClr val="accent1"/>
+          </a:fillRef>
+          <a:effectRef idx="0">
+            <a:schemeClr val="accent1"/>
+          </a:effectRef>
+          <a:fontRef idx="minor">
+            <a:schemeClr val="lt1"/>
+          </a:fontRef>
+        </p:style>
+        <p:txBody>
+          <a:bodyPr rtlCol="0" anchor="ctr"/>
+          <a:lstStyle/>
+          <a:p>
+            <a:pPr algn="ctr"/>
+            <a:endParaRPr lang="en-US"/>
+          </a:p>
+        </p:txBody>
+      </p:sp>
+      <p:sp>
+        <p:nvSpPr>
+          <p:cNvPr id="9" name="Isosceles Triangle 8">
+            <a:extLst>
+              <a:ext uri="{FF2B5EF4-FFF2-40B4-BE49-F238E27FC236}">
+                <a16:creationId xmlns:a16="http://schemas.microsoft.com/office/drawing/2014/main" id="{FFBE718E-CA45-1D4D-3742-5D25ED20159F}"/>
+              </a:ext>
+            </a:extLst>
+          </p:cNvPr>
+          <p:cNvSpPr/>
+          <p:nvPr/>
+        </p:nvSpPr>
+        <p:spPr>
+          <a:xfrm>
+            <a:off x="6961547" y="2425700"/>
+            <a:ext cx="235974" cy="386326"/>
+          </a:xfrm>
+          <a:prstGeom prst="triangle">
+            <a:avLst/>
+          </a:prstGeom>
+          <a:solidFill>
+            <a:srgbClr val="C87D50"/>
+          </a:solidFill>
+          <a:ln>
+            <a:solidFill>
+              <a:schemeClr val="bg1"/>
+            </a:solidFill>
+          </a:ln>
+        </p:spPr>
+        <p:style>
+          <a:lnRef idx="2">
+            <a:schemeClr val="accent1">
+              <a:shade val="15000"/>
+            </a:schemeClr>
+          </a:lnRef>
+          <a:fillRef idx="1">
+            <a:schemeClr val="accent1"/>
+          </a:fillRef>
+          <a:effectRef idx="0">
+            <a:schemeClr val="accent1"/>
+          </a:effectRef>
+          <a:fontRef idx="minor">
+            <a:schemeClr val="lt1"/>
+          </a:fontRef>
+        </p:style>
+        <p:txBody>
+          <a:bodyPr rtlCol="0" anchor="ctr"/>
+          <a:lstStyle/>
+          <a:p>
+            <a:pPr algn="ctr"/>
+            <a:endParaRPr lang="en-US"/>
+          </a:p>
+        </p:txBody>
+      </p:sp>
+      <p:sp>
+        <p:nvSpPr>
+          <p:cNvPr id="10" name="Isosceles Triangle 9">
+            <a:extLst>
+              <a:ext uri="{FF2B5EF4-FFF2-40B4-BE49-F238E27FC236}">
+                <a16:creationId xmlns:a16="http://schemas.microsoft.com/office/drawing/2014/main" id="{57853D22-2553-AAF8-B6A7-9E05FFAEBDD2}"/>
+              </a:ext>
+            </a:extLst>
+          </p:cNvPr>
+          <p:cNvSpPr/>
+          <p:nvPr/>
+        </p:nvSpPr>
+        <p:spPr>
+          <a:xfrm>
+            <a:off x="7371430" y="2425700"/>
+            <a:ext cx="235974" cy="386326"/>
+          </a:xfrm>
+          <a:prstGeom prst="triangle">
+            <a:avLst/>
+          </a:prstGeom>
+          <a:solidFill>
+            <a:srgbClr val="FF0000"/>
+          </a:solidFill>
+          <a:ln>
+            <a:solidFill>
+              <a:schemeClr val="bg1"/>
+            </a:solidFill>
+          </a:ln>
+        </p:spPr>
+        <p:style>
+          <a:lnRef idx="2">
+            <a:schemeClr val="accent1">
+              <a:shade val="15000"/>
+            </a:schemeClr>
+          </a:lnRef>
+          <a:fillRef idx="1">
+            <a:schemeClr val="accent1"/>
+          </a:fillRef>
+          <a:effectRef idx="0">
+            <a:schemeClr val="accent1"/>
+          </a:effectRef>
+          <a:fontRef idx="minor">
+            <a:schemeClr val="lt1"/>
+          </a:fontRef>
+        </p:style>
+        <p:txBody>
+          <a:bodyPr rtlCol="0" anchor="ctr"/>
+          <a:lstStyle/>
+          <a:p>
+            <a:pPr algn="ctr"/>
+            <a:endParaRPr lang="en-US"/>
+          </a:p>
+        </p:txBody>
+      </p:sp>
+      <p:sp>
+        <p:nvSpPr>
+          <p:cNvPr id="11" name="Isosceles Triangle 10">
+            <a:extLst>
+              <a:ext uri="{FF2B5EF4-FFF2-40B4-BE49-F238E27FC236}">
+                <a16:creationId xmlns:a16="http://schemas.microsoft.com/office/drawing/2014/main" id="{220FB582-E864-B241-37AF-7681A9B915E3}"/>
+              </a:ext>
+            </a:extLst>
+          </p:cNvPr>
+          <p:cNvSpPr/>
+          <p:nvPr/>
+        </p:nvSpPr>
+        <p:spPr>
+          <a:xfrm>
+            <a:off x="7781313" y="2425700"/>
+            <a:ext cx="235974" cy="386326"/>
+          </a:xfrm>
+          <a:prstGeom prst="triangle">
+            <a:avLst/>
+          </a:prstGeom>
+          <a:solidFill>
+            <a:schemeClr val="accent4"/>
+          </a:solidFill>
+          <a:ln>
+            <a:solidFill>
+              <a:schemeClr val="bg1"/>
+            </a:solidFill>
+          </a:ln>
         </p:spPr>
         <p:style>
           <a:lnRef idx="2">

</xml_diff>